<commit_message>
added Pylon Cut Detector
</commit_message>
<xml_diff>
--- a/Race Analyzer.pptx
+++ b/Race Analyzer.pptx
@@ -8,7 +8,6 @@
     <p:sldId id="256" r:id="rId2"/>
     <p:sldId id="257" r:id="rId3"/>
     <p:sldId id="258" r:id="rId4"/>
-    <p:sldId id="259" r:id="rId5"/>
   </p:sldIdLst>
   <p:sldSz cx="12192000" cy="6858000"/>
   <p:notesSz cx="6858000" cy="9144000"/>
@@ -107,11 +106,6 @@
       </a:defRPr>
     </a:lvl9pPr>
   </p:defaultTextStyle>
-  <p:extLst>
-    <p:ext uri="{EFAFB233-063F-42B5-8137-9DF3F51BA10A}">
-      <p15:sldGuideLst xmlns:p15="http://schemas.microsoft.com/office/powerpoint/2012/main"/>
-    </p:ext>
-  </p:extLst>
 </p:presentation>
 </file>
 
@@ -137,7 +131,7 @@
           <p:cNvPr id="2" name="Title 1">
             <a:extLst>
               <a:ext uri="{FF2B5EF4-FFF2-40B4-BE49-F238E27FC236}">
-                <a16:creationId xmlns:a16="http://schemas.microsoft.com/office/drawing/2014/main" id="{AA7C2956-0655-B3D4-529E-DF36F1A0C4EC}"/>
+                <a16:creationId xmlns:a16="http://schemas.microsoft.com/office/drawing/2014/main" id="{94FB6EA8-471A-0214-A4BF-915728FF1F64}"/>
               </a:ext>
             </a:extLst>
           </p:cNvPr>
@@ -174,7 +168,7 @@
           <p:cNvPr id="3" name="Subtitle 2">
             <a:extLst>
               <a:ext uri="{FF2B5EF4-FFF2-40B4-BE49-F238E27FC236}">
-                <a16:creationId xmlns:a16="http://schemas.microsoft.com/office/drawing/2014/main" id="{E752CC93-4D1A-F03B-0A95-E6339F82C6FD}"/>
+                <a16:creationId xmlns:a16="http://schemas.microsoft.com/office/drawing/2014/main" id="{1D2B4902-92B8-4F8C-9B07-DA8AFE608C0C}"/>
               </a:ext>
             </a:extLst>
           </p:cNvPr>
@@ -244,7 +238,7 @@
           <p:cNvPr id="4" name="Date Placeholder 3">
             <a:extLst>
               <a:ext uri="{FF2B5EF4-FFF2-40B4-BE49-F238E27FC236}">
-                <a16:creationId xmlns:a16="http://schemas.microsoft.com/office/drawing/2014/main" id="{4DB449A6-745B-2F5F-151C-22282D148B69}"/>
+                <a16:creationId xmlns:a16="http://schemas.microsoft.com/office/drawing/2014/main" id="{84BAD223-6358-3FC4-EF14-4A85D331040E}"/>
               </a:ext>
             </a:extLst>
           </p:cNvPr>
@@ -260,9 +254,9 @@
           <a:bodyPr/>
           <a:lstStyle/>
           <a:p>
-            <a:fld id="{CB7706F8-C045-4CB2-A324-08CA411FD4A0}" type="datetimeFigureOut">
+            <a:fld id="{3377F88E-94C8-407A-A9EA-53A5AAA6BEC5}" type="datetimeFigureOut">
               <a:rPr lang="en-US" smtClean="0"/>
-              <a:t>10/19/2024</a:t>
+              <a:t>10/29/2024</a:t>
             </a:fld>
             <a:endParaRPr lang="en-US"/>
           </a:p>
@@ -273,7 +267,7 @@
           <p:cNvPr id="5" name="Footer Placeholder 4">
             <a:extLst>
               <a:ext uri="{FF2B5EF4-FFF2-40B4-BE49-F238E27FC236}">
-                <a16:creationId xmlns:a16="http://schemas.microsoft.com/office/drawing/2014/main" id="{F49CC8E1-63F8-2FDF-D2D6-FBE0FE746E39}"/>
+                <a16:creationId xmlns:a16="http://schemas.microsoft.com/office/drawing/2014/main" id="{DEA59E6B-3A55-98A5-FBE1-CF3CA24746F5}"/>
               </a:ext>
             </a:extLst>
           </p:cNvPr>
@@ -298,7 +292,7 @@
           <p:cNvPr id="6" name="Slide Number Placeholder 5">
             <a:extLst>
               <a:ext uri="{FF2B5EF4-FFF2-40B4-BE49-F238E27FC236}">
-                <a16:creationId xmlns:a16="http://schemas.microsoft.com/office/drawing/2014/main" id="{2FB1DE19-5B53-8EB8-6874-F13C55556651}"/>
+                <a16:creationId xmlns:a16="http://schemas.microsoft.com/office/drawing/2014/main" id="{894376E0-4AC6-ED5D-37BC-90EAD30E2511}"/>
               </a:ext>
             </a:extLst>
           </p:cNvPr>
@@ -314,7 +308,7 @@
           <a:bodyPr/>
           <a:lstStyle/>
           <a:p>
-            <a:fld id="{F0075F2E-E4E0-4F4E-B318-CA7312C05970}" type="slidenum">
+            <a:fld id="{FF4728B6-FE0E-455E-8B04-B6D9BED54AE3}" type="slidenum">
               <a:rPr lang="en-US" smtClean="0"/>
               <a:t>‹#›</a:t>
             </a:fld>
@@ -325,7 +319,7 @@
     </p:spTree>
     <p:extLst>
       <p:ext uri="{BB962C8B-B14F-4D97-AF65-F5344CB8AC3E}">
-        <p14:creationId xmlns:p14="http://schemas.microsoft.com/office/powerpoint/2010/main" val="928259734"/>
+        <p14:creationId xmlns:p14="http://schemas.microsoft.com/office/powerpoint/2010/main" val="3136547399"/>
       </p:ext>
     </p:extLst>
   </p:cSld>
@@ -357,7 +351,7 @@
           <p:cNvPr id="2" name="Title 1">
             <a:extLst>
               <a:ext uri="{FF2B5EF4-FFF2-40B4-BE49-F238E27FC236}">
-                <a16:creationId xmlns:a16="http://schemas.microsoft.com/office/drawing/2014/main" id="{49AF43F9-642B-A76F-8486-49B686BCF184}"/>
+                <a16:creationId xmlns:a16="http://schemas.microsoft.com/office/drawing/2014/main" id="{53993A81-81D6-74DF-D986-486D4E614D77}"/>
               </a:ext>
             </a:extLst>
           </p:cNvPr>
@@ -385,7 +379,7 @@
           <p:cNvPr id="3" name="Vertical Text Placeholder 2">
             <a:extLst>
               <a:ext uri="{FF2B5EF4-FFF2-40B4-BE49-F238E27FC236}">
-                <a16:creationId xmlns:a16="http://schemas.microsoft.com/office/drawing/2014/main" id="{0A6398B7-50DD-5C7E-3687-CE2688E76878}"/>
+                <a16:creationId xmlns:a16="http://schemas.microsoft.com/office/drawing/2014/main" id="{9F772A9C-909D-6218-B6B9-35A6B4DB1182}"/>
               </a:ext>
             </a:extLst>
           </p:cNvPr>
@@ -442,7 +436,7 @@
           <p:cNvPr id="4" name="Date Placeholder 3">
             <a:extLst>
               <a:ext uri="{FF2B5EF4-FFF2-40B4-BE49-F238E27FC236}">
-                <a16:creationId xmlns:a16="http://schemas.microsoft.com/office/drawing/2014/main" id="{67643861-AAC2-5FE1-2667-CA9EB76E931A}"/>
+                <a16:creationId xmlns:a16="http://schemas.microsoft.com/office/drawing/2014/main" id="{7ADF17E5-51EF-336E-BB72-313A6669C759}"/>
               </a:ext>
             </a:extLst>
           </p:cNvPr>
@@ -458,9 +452,9 @@
           <a:bodyPr/>
           <a:lstStyle/>
           <a:p>
-            <a:fld id="{CB7706F8-C045-4CB2-A324-08CA411FD4A0}" type="datetimeFigureOut">
+            <a:fld id="{3377F88E-94C8-407A-A9EA-53A5AAA6BEC5}" type="datetimeFigureOut">
               <a:rPr lang="en-US" smtClean="0"/>
-              <a:t>10/19/2024</a:t>
+              <a:t>10/29/2024</a:t>
             </a:fld>
             <a:endParaRPr lang="en-US"/>
           </a:p>
@@ -471,7 +465,7 @@
           <p:cNvPr id="5" name="Footer Placeholder 4">
             <a:extLst>
               <a:ext uri="{FF2B5EF4-FFF2-40B4-BE49-F238E27FC236}">
-                <a16:creationId xmlns:a16="http://schemas.microsoft.com/office/drawing/2014/main" id="{62D4B14C-EA66-CA29-9D89-DF8FABE4A416}"/>
+                <a16:creationId xmlns:a16="http://schemas.microsoft.com/office/drawing/2014/main" id="{0C0ED9A3-3088-9AF7-391C-C8FB8957EDAB}"/>
               </a:ext>
             </a:extLst>
           </p:cNvPr>
@@ -496,7 +490,7 @@
           <p:cNvPr id="6" name="Slide Number Placeholder 5">
             <a:extLst>
               <a:ext uri="{FF2B5EF4-FFF2-40B4-BE49-F238E27FC236}">
-                <a16:creationId xmlns:a16="http://schemas.microsoft.com/office/drawing/2014/main" id="{3D22FDAF-38B3-472F-9D93-6A15840DF2F4}"/>
+                <a16:creationId xmlns:a16="http://schemas.microsoft.com/office/drawing/2014/main" id="{89811198-167B-F3AE-513E-729E9CD34DA0}"/>
               </a:ext>
             </a:extLst>
           </p:cNvPr>
@@ -512,7 +506,7 @@
           <a:bodyPr/>
           <a:lstStyle/>
           <a:p>
-            <a:fld id="{F0075F2E-E4E0-4F4E-B318-CA7312C05970}" type="slidenum">
+            <a:fld id="{FF4728B6-FE0E-455E-8B04-B6D9BED54AE3}" type="slidenum">
               <a:rPr lang="en-US" smtClean="0"/>
               <a:t>‹#›</a:t>
             </a:fld>
@@ -523,7 +517,7 @@
     </p:spTree>
     <p:extLst>
       <p:ext uri="{BB962C8B-B14F-4D97-AF65-F5344CB8AC3E}">
-        <p14:creationId xmlns:p14="http://schemas.microsoft.com/office/powerpoint/2010/main" val="1773408294"/>
+        <p14:creationId xmlns:p14="http://schemas.microsoft.com/office/powerpoint/2010/main" val="518504001"/>
       </p:ext>
     </p:extLst>
   </p:cSld>
@@ -555,7 +549,7 @@
           <p:cNvPr id="2" name="Vertical Title 1">
             <a:extLst>
               <a:ext uri="{FF2B5EF4-FFF2-40B4-BE49-F238E27FC236}">
-                <a16:creationId xmlns:a16="http://schemas.microsoft.com/office/drawing/2014/main" id="{8C613170-B6CB-BE0E-6C41-CE31114C1ABB}"/>
+                <a16:creationId xmlns:a16="http://schemas.microsoft.com/office/drawing/2014/main" id="{D4DD5538-3185-D550-D57E-58741B5FDE79}"/>
               </a:ext>
             </a:extLst>
           </p:cNvPr>
@@ -588,7 +582,7 @@
           <p:cNvPr id="3" name="Vertical Text Placeholder 2">
             <a:extLst>
               <a:ext uri="{FF2B5EF4-FFF2-40B4-BE49-F238E27FC236}">
-                <a16:creationId xmlns:a16="http://schemas.microsoft.com/office/drawing/2014/main" id="{45A77D35-6F06-0EDE-2218-6A0AF7F323EE}"/>
+                <a16:creationId xmlns:a16="http://schemas.microsoft.com/office/drawing/2014/main" id="{044D30E1-7F14-4443-149B-EC9E84981ABF}"/>
               </a:ext>
             </a:extLst>
           </p:cNvPr>
@@ -650,7 +644,7 @@
           <p:cNvPr id="4" name="Date Placeholder 3">
             <a:extLst>
               <a:ext uri="{FF2B5EF4-FFF2-40B4-BE49-F238E27FC236}">
-                <a16:creationId xmlns:a16="http://schemas.microsoft.com/office/drawing/2014/main" id="{61E1AAB0-F0D8-9622-4B9A-1D906EEFF1D2}"/>
+                <a16:creationId xmlns:a16="http://schemas.microsoft.com/office/drawing/2014/main" id="{4184C668-56BB-AFE3-16A9-FB814E950FF8}"/>
               </a:ext>
             </a:extLst>
           </p:cNvPr>
@@ -666,9 +660,9 @@
           <a:bodyPr/>
           <a:lstStyle/>
           <a:p>
-            <a:fld id="{CB7706F8-C045-4CB2-A324-08CA411FD4A0}" type="datetimeFigureOut">
+            <a:fld id="{3377F88E-94C8-407A-A9EA-53A5AAA6BEC5}" type="datetimeFigureOut">
               <a:rPr lang="en-US" smtClean="0"/>
-              <a:t>10/19/2024</a:t>
+              <a:t>10/29/2024</a:t>
             </a:fld>
             <a:endParaRPr lang="en-US"/>
           </a:p>
@@ -679,7 +673,7 @@
           <p:cNvPr id="5" name="Footer Placeholder 4">
             <a:extLst>
               <a:ext uri="{FF2B5EF4-FFF2-40B4-BE49-F238E27FC236}">
-                <a16:creationId xmlns:a16="http://schemas.microsoft.com/office/drawing/2014/main" id="{7053D836-C94C-0F0A-FE40-FB9D12C8E36D}"/>
+                <a16:creationId xmlns:a16="http://schemas.microsoft.com/office/drawing/2014/main" id="{619A8525-C14F-5233-06DC-3DC508FBC4A0}"/>
               </a:ext>
             </a:extLst>
           </p:cNvPr>
@@ -704,7 +698,7 @@
           <p:cNvPr id="6" name="Slide Number Placeholder 5">
             <a:extLst>
               <a:ext uri="{FF2B5EF4-FFF2-40B4-BE49-F238E27FC236}">
-                <a16:creationId xmlns:a16="http://schemas.microsoft.com/office/drawing/2014/main" id="{E8B3718B-83AD-D82B-4FF5-F8D354F63958}"/>
+                <a16:creationId xmlns:a16="http://schemas.microsoft.com/office/drawing/2014/main" id="{BEE7F623-AE8B-F408-54E6-4CF9FFEE1CF4}"/>
               </a:ext>
             </a:extLst>
           </p:cNvPr>
@@ -720,7 +714,7 @@
           <a:bodyPr/>
           <a:lstStyle/>
           <a:p>
-            <a:fld id="{F0075F2E-E4E0-4F4E-B318-CA7312C05970}" type="slidenum">
+            <a:fld id="{FF4728B6-FE0E-455E-8B04-B6D9BED54AE3}" type="slidenum">
               <a:rPr lang="en-US" smtClean="0"/>
               <a:t>‹#›</a:t>
             </a:fld>
@@ -731,7 +725,7 @@
     </p:spTree>
     <p:extLst>
       <p:ext uri="{BB962C8B-B14F-4D97-AF65-F5344CB8AC3E}">
-        <p14:creationId xmlns:p14="http://schemas.microsoft.com/office/powerpoint/2010/main" val="675148086"/>
+        <p14:creationId xmlns:p14="http://schemas.microsoft.com/office/powerpoint/2010/main" val="2048292631"/>
       </p:ext>
     </p:extLst>
   </p:cSld>
@@ -763,7 +757,7 @@
           <p:cNvPr id="2" name="Title 1">
             <a:extLst>
               <a:ext uri="{FF2B5EF4-FFF2-40B4-BE49-F238E27FC236}">
-                <a16:creationId xmlns:a16="http://schemas.microsoft.com/office/drawing/2014/main" id="{BBF7BFE5-A1CC-E917-3167-D2EFF3FD403C}"/>
+                <a16:creationId xmlns:a16="http://schemas.microsoft.com/office/drawing/2014/main" id="{CD033A44-4EEA-070E-76CF-ADD03204AA35}"/>
               </a:ext>
             </a:extLst>
           </p:cNvPr>
@@ -791,7 +785,7 @@
           <p:cNvPr id="3" name="Content Placeholder 2">
             <a:extLst>
               <a:ext uri="{FF2B5EF4-FFF2-40B4-BE49-F238E27FC236}">
-                <a16:creationId xmlns:a16="http://schemas.microsoft.com/office/drawing/2014/main" id="{FB162F6A-92DC-7396-D284-8E34789B67F1}"/>
+                <a16:creationId xmlns:a16="http://schemas.microsoft.com/office/drawing/2014/main" id="{1491564B-74A1-2EC9-E18D-12B80A48F27D}"/>
               </a:ext>
             </a:extLst>
           </p:cNvPr>
@@ -848,7 +842,7 @@
           <p:cNvPr id="4" name="Date Placeholder 3">
             <a:extLst>
               <a:ext uri="{FF2B5EF4-FFF2-40B4-BE49-F238E27FC236}">
-                <a16:creationId xmlns:a16="http://schemas.microsoft.com/office/drawing/2014/main" id="{37E5BD1B-C42A-A257-F5C3-86F7B988D209}"/>
+                <a16:creationId xmlns:a16="http://schemas.microsoft.com/office/drawing/2014/main" id="{C00D8B69-919B-447E-F077-E2DD97C2176A}"/>
               </a:ext>
             </a:extLst>
           </p:cNvPr>
@@ -864,9 +858,9 @@
           <a:bodyPr/>
           <a:lstStyle/>
           <a:p>
-            <a:fld id="{CB7706F8-C045-4CB2-A324-08CA411FD4A0}" type="datetimeFigureOut">
+            <a:fld id="{3377F88E-94C8-407A-A9EA-53A5AAA6BEC5}" type="datetimeFigureOut">
               <a:rPr lang="en-US" smtClean="0"/>
-              <a:t>10/19/2024</a:t>
+              <a:t>10/29/2024</a:t>
             </a:fld>
             <a:endParaRPr lang="en-US"/>
           </a:p>
@@ -877,7 +871,7 @@
           <p:cNvPr id="5" name="Footer Placeholder 4">
             <a:extLst>
               <a:ext uri="{FF2B5EF4-FFF2-40B4-BE49-F238E27FC236}">
-                <a16:creationId xmlns:a16="http://schemas.microsoft.com/office/drawing/2014/main" id="{AD76E6A2-0948-30A2-07AE-05B1B8E6FF7A}"/>
+                <a16:creationId xmlns:a16="http://schemas.microsoft.com/office/drawing/2014/main" id="{7434CF87-89CB-5FC7-7924-30FD66E5244D}"/>
               </a:ext>
             </a:extLst>
           </p:cNvPr>
@@ -902,7 +896,7 @@
           <p:cNvPr id="6" name="Slide Number Placeholder 5">
             <a:extLst>
               <a:ext uri="{FF2B5EF4-FFF2-40B4-BE49-F238E27FC236}">
-                <a16:creationId xmlns:a16="http://schemas.microsoft.com/office/drawing/2014/main" id="{2090F552-64B6-849A-4663-190CA43ABD8A}"/>
+                <a16:creationId xmlns:a16="http://schemas.microsoft.com/office/drawing/2014/main" id="{6DE42A2C-CFE6-84F5-21BE-81C6EC480850}"/>
               </a:ext>
             </a:extLst>
           </p:cNvPr>
@@ -918,7 +912,7 @@
           <a:bodyPr/>
           <a:lstStyle/>
           <a:p>
-            <a:fld id="{F0075F2E-E4E0-4F4E-B318-CA7312C05970}" type="slidenum">
+            <a:fld id="{FF4728B6-FE0E-455E-8B04-B6D9BED54AE3}" type="slidenum">
               <a:rPr lang="en-US" smtClean="0"/>
               <a:t>‹#›</a:t>
             </a:fld>
@@ -929,7 +923,7 @@
     </p:spTree>
     <p:extLst>
       <p:ext uri="{BB962C8B-B14F-4D97-AF65-F5344CB8AC3E}">
-        <p14:creationId xmlns:p14="http://schemas.microsoft.com/office/powerpoint/2010/main" val="1884181987"/>
+        <p14:creationId xmlns:p14="http://schemas.microsoft.com/office/powerpoint/2010/main" val="734260356"/>
       </p:ext>
     </p:extLst>
   </p:cSld>
@@ -961,7 +955,7 @@
           <p:cNvPr id="2" name="Title 1">
             <a:extLst>
               <a:ext uri="{FF2B5EF4-FFF2-40B4-BE49-F238E27FC236}">
-                <a16:creationId xmlns:a16="http://schemas.microsoft.com/office/drawing/2014/main" id="{A10078B0-0F06-A73C-4809-AA45BA1EB687}"/>
+                <a16:creationId xmlns:a16="http://schemas.microsoft.com/office/drawing/2014/main" id="{DA5AF002-5658-6A9B-5C38-CA9E9E95439B}"/>
               </a:ext>
             </a:extLst>
           </p:cNvPr>
@@ -998,7 +992,7 @@
           <p:cNvPr id="3" name="Text Placeholder 2">
             <a:extLst>
               <a:ext uri="{FF2B5EF4-FFF2-40B4-BE49-F238E27FC236}">
-                <a16:creationId xmlns:a16="http://schemas.microsoft.com/office/drawing/2014/main" id="{C4FA8944-0D0D-8144-6A70-2827BF019E5F}"/>
+                <a16:creationId xmlns:a16="http://schemas.microsoft.com/office/drawing/2014/main" id="{01F56831-7BDB-AF5B-F211-42EC0F6B757C}"/>
               </a:ext>
             </a:extLst>
           </p:cNvPr>
@@ -1123,7 +1117,7 @@
           <p:cNvPr id="4" name="Date Placeholder 3">
             <a:extLst>
               <a:ext uri="{FF2B5EF4-FFF2-40B4-BE49-F238E27FC236}">
-                <a16:creationId xmlns:a16="http://schemas.microsoft.com/office/drawing/2014/main" id="{AAB94799-2E1E-42A3-9E4F-CECC0F5D4DD8}"/>
+                <a16:creationId xmlns:a16="http://schemas.microsoft.com/office/drawing/2014/main" id="{F571B66C-343D-1474-D6BF-C703C8BEC9BD}"/>
               </a:ext>
             </a:extLst>
           </p:cNvPr>
@@ -1139,9 +1133,9 @@
           <a:bodyPr/>
           <a:lstStyle/>
           <a:p>
-            <a:fld id="{CB7706F8-C045-4CB2-A324-08CA411FD4A0}" type="datetimeFigureOut">
+            <a:fld id="{3377F88E-94C8-407A-A9EA-53A5AAA6BEC5}" type="datetimeFigureOut">
               <a:rPr lang="en-US" smtClean="0"/>
-              <a:t>10/19/2024</a:t>
+              <a:t>10/29/2024</a:t>
             </a:fld>
             <a:endParaRPr lang="en-US"/>
           </a:p>
@@ -1152,7 +1146,7 @@
           <p:cNvPr id="5" name="Footer Placeholder 4">
             <a:extLst>
               <a:ext uri="{FF2B5EF4-FFF2-40B4-BE49-F238E27FC236}">
-                <a16:creationId xmlns:a16="http://schemas.microsoft.com/office/drawing/2014/main" id="{C07DFC84-DD83-6C70-ACC3-703C0A2A9FAD}"/>
+                <a16:creationId xmlns:a16="http://schemas.microsoft.com/office/drawing/2014/main" id="{56EB0BA9-4DEB-2B0B-368C-50A1F8E175F6}"/>
               </a:ext>
             </a:extLst>
           </p:cNvPr>
@@ -1177,7 +1171,7 @@
           <p:cNvPr id="6" name="Slide Number Placeholder 5">
             <a:extLst>
               <a:ext uri="{FF2B5EF4-FFF2-40B4-BE49-F238E27FC236}">
-                <a16:creationId xmlns:a16="http://schemas.microsoft.com/office/drawing/2014/main" id="{A7D4E7A5-CD5F-2B5D-5177-F39793097411}"/>
+                <a16:creationId xmlns:a16="http://schemas.microsoft.com/office/drawing/2014/main" id="{B8565A5F-58EB-BEB2-E252-C3083B313EB4}"/>
               </a:ext>
             </a:extLst>
           </p:cNvPr>
@@ -1193,7 +1187,7 @@
           <a:bodyPr/>
           <a:lstStyle/>
           <a:p>
-            <a:fld id="{F0075F2E-E4E0-4F4E-B318-CA7312C05970}" type="slidenum">
+            <a:fld id="{FF4728B6-FE0E-455E-8B04-B6D9BED54AE3}" type="slidenum">
               <a:rPr lang="en-US" smtClean="0"/>
               <a:t>‹#›</a:t>
             </a:fld>
@@ -1204,7 +1198,7 @@
     </p:spTree>
     <p:extLst>
       <p:ext uri="{BB962C8B-B14F-4D97-AF65-F5344CB8AC3E}">
-        <p14:creationId xmlns:p14="http://schemas.microsoft.com/office/powerpoint/2010/main" val="680469617"/>
+        <p14:creationId xmlns:p14="http://schemas.microsoft.com/office/powerpoint/2010/main" val="2048500970"/>
       </p:ext>
     </p:extLst>
   </p:cSld>
@@ -1236,7 +1230,7 @@
           <p:cNvPr id="2" name="Title 1">
             <a:extLst>
               <a:ext uri="{FF2B5EF4-FFF2-40B4-BE49-F238E27FC236}">
-                <a16:creationId xmlns:a16="http://schemas.microsoft.com/office/drawing/2014/main" id="{2AF0EEFC-1604-7F91-F1B6-96F484561930}"/>
+                <a16:creationId xmlns:a16="http://schemas.microsoft.com/office/drawing/2014/main" id="{0B3D2670-5092-2F17-BBAC-B0E95A3EAACC}"/>
               </a:ext>
             </a:extLst>
           </p:cNvPr>
@@ -1264,7 +1258,7 @@
           <p:cNvPr id="3" name="Content Placeholder 2">
             <a:extLst>
               <a:ext uri="{FF2B5EF4-FFF2-40B4-BE49-F238E27FC236}">
-                <a16:creationId xmlns:a16="http://schemas.microsoft.com/office/drawing/2014/main" id="{26CA3657-9EEA-66AC-381B-127A30630D48}"/>
+                <a16:creationId xmlns:a16="http://schemas.microsoft.com/office/drawing/2014/main" id="{D6002E60-94EA-F520-D60D-001D25EB71F9}"/>
               </a:ext>
             </a:extLst>
           </p:cNvPr>
@@ -1326,7 +1320,7 @@
           <p:cNvPr id="4" name="Content Placeholder 3">
             <a:extLst>
               <a:ext uri="{FF2B5EF4-FFF2-40B4-BE49-F238E27FC236}">
-                <a16:creationId xmlns:a16="http://schemas.microsoft.com/office/drawing/2014/main" id="{652A90D3-DFCF-73B9-2D7A-22D99D53AA6B}"/>
+                <a16:creationId xmlns:a16="http://schemas.microsoft.com/office/drawing/2014/main" id="{76DDEC2D-D531-68A4-40F8-2BCBB63D5CB0}"/>
               </a:ext>
             </a:extLst>
           </p:cNvPr>
@@ -1388,7 +1382,7 @@
           <p:cNvPr id="5" name="Date Placeholder 4">
             <a:extLst>
               <a:ext uri="{FF2B5EF4-FFF2-40B4-BE49-F238E27FC236}">
-                <a16:creationId xmlns:a16="http://schemas.microsoft.com/office/drawing/2014/main" id="{50AD410D-D804-02CE-BE2E-F8EEC9BEB31D}"/>
+                <a16:creationId xmlns:a16="http://schemas.microsoft.com/office/drawing/2014/main" id="{124C36E5-9F03-BBB8-D33E-234FBACFC21F}"/>
               </a:ext>
             </a:extLst>
           </p:cNvPr>
@@ -1404,9 +1398,9 @@
           <a:bodyPr/>
           <a:lstStyle/>
           <a:p>
-            <a:fld id="{CB7706F8-C045-4CB2-A324-08CA411FD4A0}" type="datetimeFigureOut">
+            <a:fld id="{3377F88E-94C8-407A-A9EA-53A5AAA6BEC5}" type="datetimeFigureOut">
               <a:rPr lang="en-US" smtClean="0"/>
-              <a:t>10/19/2024</a:t>
+              <a:t>10/29/2024</a:t>
             </a:fld>
             <a:endParaRPr lang="en-US"/>
           </a:p>
@@ -1417,7 +1411,7 @@
           <p:cNvPr id="6" name="Footer Placeholder 5">
             <a:extLst>
               <a:ext uri="{FF2B5EF4-FFF2-40B4-BE49-F238E27FC236}">
-                <a16:creationId xmlns:a16="http://schemas.microsoft.com/office/drawing/2014/main" id="{E0FC2773-738D-2A51-749F-47288C6D4268}"/>
+                <a16:creationId xmlns:a16="http://schemas.microsoft.com/office/drawing/2014/main" id="{8BF596AB-B74D-3035-9C03-418AF7044B42}"/>
               </a:ext>
             </a:extLst>
           </p:cNvPr>
@@ -1442,7 +1436,7 @@
           <p:cNvPr id="7" name="Slide Number Placeholder 6">
             <a:extLst>
               <a:ext uri="{FF2B5EF4-FFF2-40B4-BE49-F238E27FC236}">
-                <a16:creationId xmlns:a16="http://schemas.microsoft.com/office/drawing/2014/main" id="{7D241BF3-8C4F-4605-C633-5E54939A36F3}"/>
+                <a16:creationId xmlns:a16="http://schemas.microsoft.com/office/drawing/2014/main" id="{6D437224-3A09-8919-4E5F-46369C1D57CE}"/>
               </a:ext>
             </a:extLst>
           </p:cNvPr>
@@ -1458,7 +1452,7 @@
           <a:bodyPr/>
           <a:lstStyle/>
           <a:p>
-            <a:fld id="{F0075F2E-E4E0-4F4E-B318-CA7312C05970}" type="slidenum">
+            <a:fld id="{FF4728B6-FE0E-455E-8B04-B6D9BED54AE3}" type="slidenum">
               <a:rPr lang="en-US" smtClean="0"/>
               <a:t>‹#›</a:t>
             </a:fld>
@@ -1469,7 +1463,7 @@
     </p:spTree>
     <p:extLst>
       <p:ext uri="{BB962C8B-B14F-4D97-AF65-F5344CB8AC3E}">
-        <p14:creationId xmlns:p14="http://schemas.microsoft.com/office/powerpoint/2010/main" val="713062676"/>
+        <p14:creationId xmlns:p14="http://schemas.microsoft.com/office/powerpoint/2010/main" val="4243049685"/>
       </p:ext>
     </p:extLst>
   </p:cSld>
@@ -1501,7 +1495,7 @@
           <p:cNvPr id="2" name="Title 1">
             <a:extLst>
               <a:ext uri="{FF2B5EF4-FFF2-40B4-BE49-F238E27FC236}">
-                <a16:creationId xmlns:a16="http://schemas.microsoft.com/office/drawing/2014/main" id="{BF0468BD-04DC-B7E4-CA3F-0AAB28DAA9F2}"/>
+                <a16:creationId xmlns:a16="http://schemas.microsoft.com/office/drawing/2014/main" id="{08370CA5-D394-0EC3-4C21-1D7B3DFAB6DA}"/>
               </a:ext>
             </a:extLst>
           </p:cNvPr>
@@ -1534,7 +1528,7 @@
           <p:cNvPr id="3" name="Text Placeholder 2">
             <a:extLst>
               <a:ext uri="{FF2B5EF4-FFF2-40B4-BE49-F238E27FC236}">
-                <a16:creationId xmlns:a16="http://schemas.microsoft.com/office/drawing/2014/main" id="{F3A853EE-9E8D-AF31-94AD-DCFEEF85FBC8}"/>
+                <a16:creationId xmlns:a16="http://schemas.microsoft.com/office/drawing/2014/main" id="{C5DDF751-1A10-B641-8A1F-BF1FDD616AF4}"/>
               </a:ext>
             </a:extLst>
           </p:cNvPr>
@@ -1605,7 +1599,7 @@
           <p:cNvPr id="4" name="Content Placeholder 3">
             <a:extLst>
               <a:ext uri="{FF2B5EF4-FFF2-40B4-BE49-F238E27FC236}">
-                <a16:creationId xmlns:a16="http://schemas.microsoft.com/office/drawing/2014/main" id="{5EAE7FED-A383-A77D-F15D-6F1B5D19E558}"/>
+                <a16:creationId xmlns:a16="http://schemas.microsoft.com/office/drawing/2014/main" id="{6D8A02D3-6902-0FDF-0C4F-03CD9FE10A64}"/>
               </a:ext>
             </a:extLst>
           </p:cNvPr>
@@ -1667,7 +1661,7 @@
           <p:cNvPr id="5" name="Text Placeholder 4">
             <a:extLst>
               <a:ext uri="{FF2B5EF4-FFF2-40B4-BE49-F238E27FC236}">
-                <a16:creationId xmlns:a16="http://schemas.microsoft.com/office/drawing/2014/main" id="{56DFE648-7A4E-180B-CC82-4E447B510797}"/>
+                <a16:creationId xmlns:a16="http://schemas.microsoft.com/office/drawing/2014/main" id="{6D2C1332-68FB-FDC4-5C80-34188C876D1A}"/>
               </a:ext>
             </a:extLst>
           </p:cNvPr>
@@ -1738,7 +1732,7 @@
           <p:cNvPr id="6" name="Content Placeholder 5">
             <a:extLst>
               <a:ext uri="{FF2B5EF4-FFF2-40B4-BE49-F238E27FC236}">
-                <a16:creationId xmlns:a16="http://schemas.microsoft.com/office/drawing/2014/main" id="{31FFFE72-4FF5-8AE3-27FE-8AA82FB3CB56}"/>
+                <a16:creationId xmlns:a16="http://schemas.microsoft.com/office/drawing/2014/main" id="{73E34218-C81B-1A10-EDC4-03991183F8A9}"/>
               </a:ext>
             </a:extLst>
           </p:cNvPr>
@@ -1800,7 +1794,7 @@
           <p:cNvPr id="7" name="Date Placeholder 6">
             <a:extLst>
               <a:ext uri="{FF2B5EF4-FFF2-40B4-BE49-F238E27FC236}">
-                <a16:creationId xmlns:a16="http://schemas.microsoft.com/office/drawing/2014/main" id="{6D42B72D-F099-16DB-F540-A5DC31962492}"/>
+                <a16:creationId xmlns:a16="http://schemas.microsoft.com/office/drawing/2014/main" id="{ABB1A7F7-6B76-9302-B607-B146BCA5A1F5}"/>
               </a:ext>
             </a:extLst>
           </p:cNvPr>
@@ -1816,9 +1810,9 @@
           <a:bodyPr/>
           <a:lstStyle/>
           <a:p>
-            <a:fld id="{CB7706F8-C045-4CB2-A324-08CA411FD4A0}" type="datetimeFigureOut">
+            <a:fld id="{3377F88E-94C8-407A-A9EA-53A5AAA6BEC5}" type="datetimeFigureOut">
               <a:rPr lang="en-US" smtClean="0"/>
-              <a:t>10/19/2024</a:t>
+              <a:t>10/29/2024</a:t>
             </a:fld>
             <a:endParaRPr lang="en-US"/>
           </a:p>
@@ -1829,7 +1823,7 @@
           <p:cNvPr id="8" name="Footer Placeholder 7">
             <a:extLst>
               <a:ext uri="{FF2B5EF4-FFF2-40B4-BE49-F238E27FC236}">
-                <a16:creationId xmlns:a16="http://schemas.microsoft.com/office/drawing/2014/main" id="{2F34A1DC-5800-D540-0047-09C5510EC220}"/>
+                <a16:creationId xmlns:a16="http://schemas.microsoft.com/office/drawing/2014/main" id="{8FE37AFF-B55F-1C73-0CED-4D32A9F389B7}"/>
               </a:ext>
             </a:extLst>
           </p:cNvPr>
@@ -1854,7 +1848,7 @@
           <p:cNvPr id="9" name="Slide Number Placeholder 8">
             <a:extLst>
               <a:ext uri="{FF2B5EF4-FFF2-40B4-BE49-F238E27FC236}">
-                <a16:creationId xmlns:a16="http://schemas.microsoft.com/office/drawing/2014/main" id="{B55151CB-B76E-1424-0D7D-113A3DAB81D0}"/>
+                <a16:creationId xmlns:a16="http://schemas.microsoft.com/office/drawing/2014/main" id="{957FA381-1D13-2DC0-0493-2D6B30966CE5}"/>
               </a:ext>
             </a:extLst>
           </p:cNvPr>
@@ -1870,7 +1864,7 @@
           <a:bodyPr/>
           <a:lstStyle/>
           <a:p>
-            <a:fld id="{F0075F2E-E4E0-4F4E-B318-CA7312C05970}" type="slidenum">
+            <a:fld id="{FF4728B6-FE0E-455E-8B04-B6D9BED54AE3}" type="slidenum">
               <a:rPr lang="en-US" smtClean="0"/>
               <a:t>‹#›</a:t>
             </a:fld>
@@ -1881,7 +1875,7 @@
     </p:spTree>
     <p:extLst>
       <p:ext uri="{BB962C8B-B14F-4D97-AF65-F5344CB8AC3E}">
-        <p14:creationId xmlns:p14="http://schemas.microsoft.com/office/powerpoint/2010/main" val="2424481299"/>
+        <p14:creationId xmlns:p14="http://schemas.microsoft.com/office/powerpoint/2010/main" val="445132044"/>
       </p:ext>
     </p:extLst>
   </p:cSld>
@@ -1913,7 +1907,7 @@
           <p:cNvPr id="2" name="Title 1">
             <a:extLst>
               <a:ext uri="{FF2B5EF4-FFF2-40B4-BE49-F238E27FC236}">
-                <a16:creationId xmlns:a16="http://schemas.microsoft.com/office/drawing/2014/main" id="{3A74962F-DC31-E521-D19B-29773C954B80}"/>
+                <a16:creationId xmlns:a16="http://schemas.microsoft.com/office/drawing/2014/main" id="{9D863056-B4A8-AEDD-9BF6-254A447271A5}"/>
               </a:ext>
             </a:extLst>
           </p:cNvPr>
@@ -1941,7 +1935,7 @@
           <p:cNvPr id="3" name="Date Placeholder 2">
             <a:extLst>
               <a:ext uri="{FF2B5EF4-FFF2-40B4-BE49-F238E27FC236}">
-                <a16:creationId xmlns:a16="http://schemas.microsoft.com/office/drawing/2014/main" id="{CE3D8231-2CD1-D4CC-2BEF-2C44E4C96FF0}"/>
+                <a16:creationId xmlns:a16="http://schemas.microsoft.com/office/drawing/2014/main" id="{797A5BC8-9602-DDDD-7E7A-EAE070FEA60D}"/>
               </a:ext>
             </a:extLst>
           </p:cNvPr>
@@ -1957,9 +1951,9 @@
           <a:bodyPr/>
           <a:lstStyle/>
           <a:p>
-            <a:fld id="{CB7706F8-C045-4CB2-A324-08CA411FD4A0}" type="datetimeFigureOut">
+            <a:fld id="{3377F88E-94C8-407A-A9EA-53A5AAA6BEC5}" type="datetimeFigureOut">
               <a:rPr lang="en-US" smtClean="0"/>
-              <a:t>10/19/2024</a:t>
+              <a:t>10/29/2024</a:t>
             </a:fld>
             <a:endParaRPr lang="en-US"/>
           </a:p>
@@ -1970,7 +1964,7 @@
           <p:cNvPr id="4" name="Footer Placeholder 3">
             <a:extLst>
               <a:ext uri="{FF2B5EF4-FFF2-40B4-BE49-F238E27FC236}">
-                <a16:creationId xmlns:a16="http://schemas.microsoft.com/office/drawing/2014/main" id="{161965A5-BA07-19A4-6636-4EF3ADA9B73B}"/>
+                <a16:creationId xmlns:a16="http://schemas.microsoft.com/office/drawing/2014/main" id="{60B96466-FC69-A425-FD70-93108D97237E}"/>
               </a:ext>
             </a:extLst>
           </p:cNvPr>
@@ -1995,7 +1989,7 @@
           <p:cNvPr id="5" name="Slide Number Placeholder 4">
             <a:extLst>
               <a:ext uri="{FF2B5EF4-FFF2-40B4-BE49-F238E27FC236}">
-                <a16:creationId xmlns:a16="http://schemas.microsoft.com/office/drawing/2014/main" id="{1810B38B-9A47-61EF-0DB7-11EC1997AACB}"/>
+                <a16:creationId xmlns:a16="http://schemas.microsoft.com/office/drawing/2014/main" id="{EC46DC24-6210-7B69-87FF-EB572DF444E5}"/>
               </a:ext>
             </a:extLst>
           </p:cNvPr>
@@ -2011,7 +2005,7 @@
           <a:bodyPr/>
           <a:lstStyle/>
           <a:p>
-            <a:fld id="{F0075F2E-E4E0-4F4E-B318-CA7312C05970}" type="slidenum">
+            <a:fld id="{FF4728B6-FE0E-455E-8B04-B6D9BED54AE3}" type="slidenum">
               <a:rPr lang="en-US" smtClean="0"/>
               <a:t>‹#›</a:t>
             </a:fld>
@@ -2022,7 +2016,7 @@
     </p:spTree>
     <p:extLst>
       <p:ext uri="{BB962C8B-B14F-4D97-AF65-F5344CB8AC3E}">
-        <p14:creationId xmlns:p14="http://schemas.microsoft.com/office/powerpoint/2010/main" val="2853872556"/>
+        <p14:creationId xmlns:p14="http://schemas.microsoft.com/office/powerpoint/2010/main" val="3336271123"/>
       </p:ext>
     </p:extLst>
   </p:cSld>
@@ -2054,7 +2048,7 @@
           <p:cNvPr id="2" name="Date Placeholder 1">
             <a:extLst>
               <a:ext uri="{FF2B5EF4-FFF2-40B4-BE49-F238E27FC236}">
-                <a16:creationId xmlns:a16="http://schemas.microsoft.com/office/drawing/2014/main" id="{61990BED-5D16-F927-D557-E42E2372A588}"/>
+                <a16:creationId xmlns:a16="http://schemas.microsoft.com/office/drawing/2014/main" id="{0DE2C17D-889B-894D-8359-4A47BD382E55}"/>
               </a:ext>
             </a:extLst>
           </p:cNvPr>
@@ -2070,9 +2064,9 @@
           <a:bodyPr/>
           <a:lstStyle/>
           <a:p>
-            <a:fld id="{CB7706F8-C045-4CB2-A324-08CA411FD4A0}" type="datetimeFigureOut">
+            <a:fld id="{3377F88E-94C8-407A-A9EA-53A5AAA6BEC5}" type="datetimeFigureOut">
               <a:rPr lang="en-US" smtClean="0"/>
-              <a:t>10/19/2024</a:t>
+              <a:t>10/29/2024</a:t>
             </a:fld>
             <a:endParaRPr lang="en-US"/>
           </a:p>
@@ -2083,7 +2077,7 @@
           <p:cNvPr id="3" name="Footer Placeholder 2">
             <a:extLst>
               <a:ext uri="{FF2B5EF4-FFF2-40B4-BE49-F238E27FC236}">
-                <a16:creationId xmlns:a16="http://schemas.microsoft.com/office/drawing/2014/main" id="{3B218277-7063-4506-3B59-D1533CFA963F}"/>
+                <a16:creationId xmlns:a16="http://schemas.microsoft.com/office/drawing/2014/main" id="{EE5108B5-B2B2-60E2-F6AF-93DD9E63ABC8}"/>
               </a:ext>
             </a:extLst>
           </p:cNvPr>
@@ -2108,7 +2102,7 @@
           <p:cNvPr id="4" name="Slide Number Placeholder 3">
             <a:extLst>
               <a:ext uri="{FF2B5EF4-FFF2-40B4-BE49-F238E27FC236}">
-                <a16:creationId xmlns:a16="http://schemas.microsoft.com/office/drawing/2014/main" id="{34F652F8-AB44-7291-45A7-0790F6AA9BD4}"/>
+                <a16:creationId xmlns:a16="http://schemas.microsoft.com/office/drawing/2014/main" id="{3F86664F-D118-2B82-7DE4-496D864F9F9B}"/>
               </a:ext>
             </a:extLst>
           </p:cNvPr>
@@ -2124,7 +2118,7 @@
           <a:bodyPr/>
           <a:lstStyle/>
           <a:p>
-            <a:fld id="{F0075F2E-E4E0-4F4E-B318-CA7312C05970}" type="slidenum">
+            <a:fld id="{FF4728B6-FE0E-455E-8B04-B6D9BED54AE3}" type="slidenum">
               <a:rPr lang="en-US" smtClean="0"/>
               <a:t>‹#›</a:t>
             </a:fld>
@@ -2135,7 +2129,7 @@
     </p:spTree>
     <p:extLst>
       <p:ext uri="{BB962C8B-B14F-4D97-AF65-F5344CB8AC3E}">
-        <p14:creationId xmlns:p14="http://schemas.microsoft.com/office/powerpoint/2010/main" val="2515111923"/>
+        <p14:creationId xmlns:p14="http://schemas.microsoft.com/office/powerpoint/2010/main" val="1304633787"/>
       </p:ext>
     </p:extLst>
   </p:cSld>
@@ -2167,7 +2161,7 @@
           <p:cNvPr id="2" name="Title 1">
             <a:extLst>
               <a:ext uri="{FF2B5EF4-FFF2-40B4-BE49-F238E27FC236}">
-                <a16:creationId xmlns:a16="http://schemas.microsoft.com/office/drawing/2014/main" id="{53D1628D-A311-077B-5179-607AF3804EAA}"/>
+                <a16:creationId xmlns:a16="http://schemas.microsoft.com/office/drawing/2014/main" id="{6F0CCE90-EF90-54D3-DE23-B57C3D871CB3}"/>
               </a:ext>
             </a:extLst>
           </p:cNvPr>
@@ -2204,7 +2198,7 @@
           <p:cNvPr id="3" name="Content Placeholder 2">
             <a:extLst>
               <a:ext uri="{FF2B5EF4-FFF2-40B4-BE49-F238E27FC236}">
-                <a16:creationId xmlns:a16="http://schemas.microsoft.com/office/drawing/2014/main" id="{CB38A6DF-6A47-C752-EF6C-C0D4DFCD5991}"/>
+                <a16:creationId xmlns:a16="http://schemas.microsoft.com/office/drawing/2014/main" id="{688E23D8-8564-7F3B-B0F2-41C056F324AB}"/>
               </a:ext>
             </a:extLst>
           </p:cNvPr>
@@ -2294,7 +2288,7 @@
           <p:cNvPr id="4" name="Text Placeholder 3">
             <a:extLst>
               <a:ext uri="{FF2B5EF4-FFF2-40B4-BE49-F238E27FC236}">
-                <a16:creationId xmlns:a16="http://schemas.microsoft.com/office/drawing/2014/main" id="{0D22A629-AC00-B364-D706-56C4A3FB0C1A}"/>
+                <a16:creationId xmlns:a16="http://schemas.microsoft.com/office/drawing/2014/main" id="{A5CC438D-42CB-A309-570A-A286640CE2A8}"/>
               </a:ext>
             </a:extLst>
           </p:cNvPr>
@@ -2365,7 +2359,7 @@
           <p:cNvPr id="5" name="Date Placeholder 4">
             <a:extLst>
               <a:ext uri="{FF2B5EF4-FFF2-40B4-BE49-F238E27FC236}">
-                <a16:creationId xmlns:a16="http://schemas.microsoft.com/office/drawing/2014/main" id="{A1022FEC-4E0E-B683-3739-06968D2C9DC4}"/>
+                <a16:creationId xmlns:a16="http://schemas.microsoft.com/office/drawing/2014/main" id="{FCAE2AC4-33D1-D053-4254-1F50862CE398}"/>
               </a:ext>
             </a:extLst>
           </p:cNvPr>
@@ -2381,9 +2375,9 @@
           <a:bodyPr/>
           <a:lstStyle/>
           <a:p>
-            <a:fld id="{CB7706F8-C045-4CB2-A324-08CA411FD4A0}" type="datetimeFigureOut">
+            <a:fld id="{3377F88E-94C8-407A-A9EA-53A5AAA6BEC5}" type="datetimeFigureOut">
               <a:rPr lang="en-US" smtClean="0"/>
-              <a:t>10/19/2024</a:t>
+              <a:t>10/29/2024</a:t>
             </a:fld>
             <a:endParaRPr lang="en-US"/>
           </a:p>
@@ -2394,7 +2388,7 @@
           <p:cNvPr id="6" name="Footer Placeholder 5">
             <a:extLst>
               <a:ext uri="{FF2B5EF4-FFF2-40B4-BE49-F238E27FC236}">
-                <a16:creationId xmlns:a16="http://schemas.microsoft.com/office/drawing/2014/main" id="{4E362B96-5A00-B67C-21A3-7F16476A48FF}"/>
+                <a16:creationId xmlns:a16="http://schemas.microsoft.com/office/drawing/2014/main" id="{2808073F-BE3F-B82C-5A5D-743EE2A99A39}"/>
               </a:ext>
             </a:extLst>
           </p:cNvPr>
@@ -2419,7 +2413,7 @@
           <p:cNvPr id="7" name="Slide Number Placeholder 6">
             <a:extLst>
               <a:ext uri="{FF2B5EF4-FFF2-40B4-BE49-F238E27FC236}">
-                <a16:creationId xmlns:a16="http://schemas.microsoft.com/office/drawing/2014/main" id="{86F50E7E-F7D3-ABF4-E981-2FA11977214D}"/>
+                <a16:creationId xmlns:a16="http://schemas.microsoft.com/office/drawing/2014/main" id="{43591EB4-7697-00DD-A02E-C75E71E130F8}"/>
               </a:ext>
             </a:extLst>
           </p:cNvPr>
@@ -2435,7 +2429,7 @@
           <a:bodyPr/>
           <a:lstStyle/>
           <a:p>
-            <a:fld id="{F0075F2E-E4E0-4F4E-B318-CA7312C05970}" type="slidenum">
+            <a:fld id="{FF4728B6-FE0E-455E-8B04-B6D9BED54AE3}" type="slidenum">
               <a:rPr lang="en-US" smtClean="0"/>
               <a:t>‹#›</a:t>
             </a:fld>
@@ -2446,7 +2440,7 @@
     </p:spTree>
     <p:extLst>
       <p:ext uri="{BB962C8B-B14F-4D97-AF65-F5344CB8AC3E}">
-        <p14:creationId xmlns:p14="http://schemas.microsoft.com/office/powerpoint/2010/main" val="2663958260"/>
+        <p14:creationId xmlns:p14="http://schemas.microsoft.com/office/powerpoint/2010/main" val="430527353"/>
       </p:ext>
     </p:extLst>
   </p:cSld>
@@ -2478,7 +2472,7 @@
           <p:cNvPr id="2" name="Title 1">
             <a:extLst>
               <a:ext uri="{FF2B5EF4-FFF2-40B4-BE49-F238E27FC236}">
-                <a16:creationId xmlns:a16="http://schemas.microsoft.com/office/drawing/2014/main" id="{CF8F329C-93D6-B241-0596-B5FAD0518EBF}"/>
+                <a16:creationId xmlns:a16="http://schemas.microsoft.com/office/drawing/2014/main" id="{D68AF91E-D581-F702-D9A7-32EEB53031AE}"/>
               </a:ext>
             </a:extLst>
           </p:cNvPr>
@@ -2515,7 +2509,7 @@
           <p:cNvPr id="3" name="Picture Placeholder 2">
             <a:extLst>
               <a:ext uri="{FF2B5EF4-FFF2-40B4-BE49-F238E27FC236}">
-                <a16:creationId xmlns:a16="http://schemas.microsoft.com/office/drawing/2014/main" id="{8A0C992A-4676-98E3-9F1E-401CDB2D5E25}"/>
+                <a16:creationId xmlns:a16="http://schemas.microsoft.com/office/drawing/2014/main" id="{9D2E816E-6BC4-11A8-F5D5-09ED6B1F288D}"/>
               </a:ext>
             </a:extLst>
           </p:cNvPr>
@@ -2582,7 +2576,7 @@
           <p:cNvPr id="4" name="Text Placeholder 3">
             <a:extLst>
               <a:ext uri="{FF2B5EF4-FFF2-40B4-BE49-F238E27FC236}">
-                <a16:creationId xmlns:a16="http://schemas.microsoft.com/office/drawing/2014/main" id="{E711F2E9-4E10-A889-2F9F-E3CC8E120489}"/>
+                <a16:creationId xmlns:a16="http://schemas.microsoft.com/office/drawing/2014/main" id="{BD113128-DF2B-5E47-940E-2CF92929D4BB}"/>
               </a:ext>
             </a:extLst>
           </p:cNvPr>
@@ -2653,7 +2647,7 @@
           <p:cNvPr id="5" name="Date Placeholder 4">
             <a:extLst>
               <a:ext uri="{FF2B5EF4-FFF2-40B4-BE49-F238E27FC236}">
-                <a16:creationId xmlns:a16="http://schemas.microsoft.com/office/drawing/2014/main" id="{35F84551-0D2E-0CEA-8AE7-E90C5E560BDC}"/>
+                <a16:creationId xmlns:a16="http://schemas.microsoft.com/office/drawing/2014/main" id="{397B2911-4721-9B48-18AE-4CC7FA4243CA}"/>
               </a:ext>
             </a:extLst>
           </p:cNvPr>
@@ -2669,9 +2663,9 @@
           <a:bodyPr/>
           <a:lstStyle/>
           <a:p>
-            <a:fld id="{CB7706F8-C045-4CB2-A324-08CA411FD4A0}" type="datetimeFigureOut">
+            <a:fld id="{3377F88E-94C8-407A-A9EA-53A5AAA6BEC5}" type="datetimeFigureOut">
               <a:rPr lang="en-US" smtClean="0"/>
-              <a:t>10/19/2024</a:t>
+              <a:t>10/29/2024</a:t>
             </a:fld>
             <a:endParaRPr lang="en-US"/>
           </a:p>
@@ -2682,7 +2676,7 @@
           <p:cNvPr id="6" name="Footer Placeholder 5">
             <a:extLst>
               <a:ext uri="{FF2B5EF4-FFF2-40B4-BE49-F238E27FC236}">
-                <a16:creationId xmlns:a16="http://schemas.microsoft.com/office/drawing/2014/main" id="{8CE88B92-5CE4-E2A5-B9FF-0B8B46CA7CD1}"/>
+                <a16:creationId xmlns:a16="http://schemas.microsoft.com/office/drawing/2014/main" id="{C7D6871A-DC4F-DF9C-4C52-5305398C4E87}"/>
               </a:ext>
             </a:extLst>
           </p:cNvPr>
@@ -2707,7 +2701,7 @@
           <p:cNvPr id="7" name="Slide Number Placeholder 6">
             <a:extLst>
               <a:ext uri="{FF2B5EF4-FFF2-40B4-BE49-F238E27FC236}">
-                <a16:creationId xmlns:a16="http://schemas.microsoft.com/office/drawing/2014/main" id="{FC8C8BB7-EEB5-CAE1-61D7-2781068F1716}"/>
+                <a16:creationId xmlns:a16="http://schemas.microsoft.com/office/drawing/2014/main" id="{CF044AE9-72EC-3D22-6CC4-C99FC1C61461}"/>
               </a:ext>
             </a:extLst>
           </p:cNvPr>
@@ -2723,7 +2717,7 @@
           <a:bodyPr/>
           <a:lstStyle/>
           <a:p>
-            <a:fld id="{F0075F2E-E4E0-4F4E-B318-CA7312C05970}" type="slidenum">
+            <a:fld id="{FF4728B6-FE0E-455E-8B04-B6D9BED54AE3}" type="slidenum">
               <a:rPr lang="en-US" smtClean="0"/>
               <a:t>‹#›</a:t>
             </a:fld>
@@ -2734,7 +2728,7 @@
     </p:spTree>
     <p:extLst>
       <p:ext uri="{BB962C8B-B14F-4D97-AF65-F5344CB8AC3E}">
-        <p14:creationId xmlns:p14="http://schemas.microsoft.com/office/powerpoint/2010/main" val="358879997"/>
+        <p14:creationId xmlns:p14="http://schemas.microsoft.com/office/powerpoint/2010/main" val="151775770"/>
       </p:ext>
     </p:extLst>
   </p:cSld>
@@ -2771,7 +2765,7 @@
           <p:cNvPr id="2" name="Title Placeholder 1">
             <a:extLst>
               <a:ext uri="{FF2B5EF4-FFF2-40B4-BE49-F238E27FC236}">
-                <a16:creationId xmlns:a16="http://schemas.microsoft.com/office/drawing/2014/main" id="{2D91C1D3-4515-158B-5249-8C46620817A5}"/>
+                <a16:creationId xmlns:a16="http://schemas.microsoft.com/office/drawing/2014/main" id="{7EF91CB1-7D88-CFF6-3E83-D7BDA25AC65D}"/>
               </a:ext>
             </a:extLst>
           </p:cNvPr>
@@ -2809,7 +2803,7 @@
           <p:cNvPr id="3" name="Text Placeholder 2">
             <a:extLst>
               <a:ext uri="{FF2B5EF4-FFF2-40B4-BE49-F238E27FC236}">
-                <a16:creationId xmlns:a16="http://schemas.microsoft.com/office/drawing/2014/main" id="{952A655F-5B53-27F8-A699-76B7B16E2841}"/>
+                <a16:creationId xmlns:a16="http://schemas.microsoft.com/office/drawing/2014/main" id="{9F1DE21B-368E-7146-6378-DE624765ED94}"/>
               </a:ext>
             </a:extLst>
           </p:cNvPr>
@@ -2876,7 +2870,7 @@
           <p:cNvPr id="4" name="Date Placeholder 3">
             <a:extLst>
               <a:ext uri="{FF2B5EF4-FFF2-40B4-BE49-F238E27FC236}">
-                <a16:creationId xmlns:a16="http://schemas.microsoft.com/office/drawing/2014/main" id="{B344814C-CF96-5F2D-0173-4C62E2A62B40}"/>
+                <a16:creationId xmlns:a16="http://schemas.microsoft.com/office/drawing/2014/main" id="{A82A205C-9590-94C8-1B23-F43370467B01}"/>
               </a:ext>
             </a:extLst>
           </p:cNvPr>
@@ -2910,9 +2904,9 @@
             </a:lvl1pPr>
           </a:lstStyle>
           <a:p>
-            <a:fld id="{CB7706F8-C045-4CB2-A324-08CA411FD4A0}" type="datetimeFigureOut">
+            <a:fld id="{3377F88E-94C8-407A-A9EA-53A5AAA6BEC5}" type="datetimeFigureOut">
               <a:rPr lang="en-US" smtClean="0"/>
-              <a:t>10/19/2024</a:t>
+              <a:t>10/29/2024</a:t>
             </a:fld>
             <a:endParaRPr lang="en-US"/>
           </a:p>
@@ -2923,7 +2917,7 @@
           <p:cNvPr id="5" name="Footer Placeholder 4">
             <a:extLst>
               <a:ext uri="{FF2B5EF4-FFF2-40B4-BE49-F238E27FC236}">
-                <a16:creationId xmlns:a16="http://schemas.microsoft.com/office/drawing/2014/main" id="{6454FA1D-B358-8D55-9195-5F68CECA60B9}"/>
+                <a16:creationId xmlns:a16="http://schemas.microsoft.com/office/drawing/2014/main" id="{75AEB6E9-D559-F7E0-1F4F-EBC7DD0144E3}"/>
               </a:ext>
             </a:extLst>
           </p:cNvPr>
@@ -2966,7 +2960,7 @@
           <p:cNvPr id="6" name="Slide Number Placeholder 5">
             <a:extLst>
               <a:ext uri="{FF2B5EF4-FFF2-40B4-BE49-F238E27FC236}">
-                <a16:creationId xmlns:a16="http://schemas.microsoft.com/office/drawing/2014/main" id="{FAC5E59B-F93F-B251-ADBB-75CB26E3A89B}"/>
+                <a16:creationId xmlns:a16="http://schemas.microsoft.com/office/drawing/2014/main" id="{C5923B2A-CE92-90F7-6E83-B24F10A35B88}"/>
               </a:ext>
             </a:extLst>
           </p:cNvPr>
@@ -3000,7 +2994,7 @@
             </a:lvl1pPr>
           </a:lstStyle>
           <a:p>
-            <a:fld id="{F0075F2E-E4E0-4F4E-B318-CA7312C05970}" type="slidenum">
+            <a:fld id="{FF4728B6-FE0E-455E-8B04-B6D9BED54AE3}" type="slidenum">
               <a:rPr lang="en-US" smtClean="0"/>
               <a:t>‹#›</a:t>
             </a:fld>
@@ -3011,7 +3005,7 @@
     </p:spTree>
     <p:extLst>
       <p:ext uri="{BB962C8B-B14F-4D97-AF65-F5344CB8AC3E}">
-        <p14:creationId xmlns:p14="http://schemas.microsoft.com/office/powerpoint/2010/main" val="3871957354"/>
+        <p14:creationId xmlns:p14="http://schemas.microsoft.com/office/powerpoint/2010/main" val="1192207845"/>
       </p:ext>
     </p:extLst>
   </p:cSld>
@@ -3334,7 +3328,7 @@
           <p:cNvPr id="2" name="Title 1">
             <a:extLst>
               <a:ext uri="{FF2B5EF4-FFF2-40B4-BE49-F238E27FC236}">
-                <a16:creationId xmlns:a16="http://schemas.microsoft.com/office/drawing/2014/main" id="{60A4B03D-ED9B-0582-923C-21DB422CEA79}"/>
+                <a16:creationId xmlns:a16="http://schemas.microsoft.com/office/drawing/2014/main" id="{5B7353FB-B43F-D1FC-0412-DBA52F5F301C}"/>
               </a:ext>
             </a:extLst>
           </p:cNvPr>
@@ -3352,7 +3346,7 @@
           <a:p>
             <a:r>
               <a:rPr lang="en-US" dirty="0"/>
-              <a:t>Race Analyzer</a:t>
+              <a:t>Outer Course Summary</a:t>
             </a:r>
           </a:p>
         </p:txBody>
@@ -3362,7 +3356,7 @@
           <p:cNvPr id="3" name="Subtitle 2">
             <a:extLst>
               <a:ext uri="{FF2B5EF4-FFF2-40B4-BE49-F238E27FC236}">
-                <a16:creationId xmlns:a16="http://schemas.microsoft.com/office/drawing/2014/main" id="{475D7F21-A5E5-8ABE-FBCE-07068C31791C}"/>
+                <a16:creationId xmlns:a16="http://schemas.microsoft.com/office/drawing/2014/main" id="{DCB75C77-73DB-631C-7915-BCBE5DBE5C80}"/>
               </a:ext>
             </a:extLst>
           </p:cNvPr>
@@ -3378,14 +3372,14 @@
           <a:bodyPr/>
           <a:lstStyle/>
           <a:p>
-            <a:endParaRPr lang="en-US" dirty="0"/>
+            <a:endParaRPr lang="en-US"/>
           </a:p>
         </p:txBody>
       </p:sp>
     </p:spTree>
     <p:extLst>
       <p:ext uri="{BB962C8B-B14F-4D97-AF65-F5344CB8AC3E}">
-        <p14:creationId xmlns:p14="http://schemas.microsoft.com/office/powerpoint/2010/main" val="2593637335"/>
+        <p14:creationId xmlns:p14="http://schemas.microsoft.com/office/powerpoint/2010/main" val="2502133914"/>
       </p:ext>
     </p:extLst>
   </p:cSld>
@@ -3412,60 +3406,40 @@
           <a:chExt cx="0" cy="0"/>
         </a:xfrm>
       </p:grpSpPr>
-      <p:sp>
-        <p:nvSpPr>
-          <p:cNvPr id="2" name="Title 1">
-            <a:extLst>
-              <a:ext uri="{FF2B5EF4-FFF2-40B4-BE49-F238E27FC236}">
-                <a16:creationId xmlns:a16="http://schemas.microsoft.com/office/drawing/2014/main" id="{9451EDF1-343B-3C87-B9BE-2263714FAB91}"/>
-              </a:ext>
-            </a:extLst>
-          </p:cNvPr>
-          <p:cNvSpPr>
-            <a:spLocks noGrp="1"/>
-          </p:cNvSpPr>
-          <p:nvPr>
-            <p:ph type="title"/>
-          </p:nvPr>
-        </p:nvSpPr>
-        <p:spPr/>
-        <p:txBody>
-          <a:bodyPr/>
-          <a:lstStyle/>
-          <a:p>
-            <a:endParaRPr lang="en-US"/>
-          </a:p>
-        </p:txBody>
-      </p:sp>
-      <p:sp>
-        <p:nvSpPr>
-          <p:cNvPr id="3" name="Content Placeholder 2">
-            <a:extLst>
-              <a:ext uri="{FF2B5EF4-FFF2-40B4-BE49-F238E27FC236}">
-                <a16:creationId xmlns:a16="http://schemas.microsoft.com/office/drawing/2014/main" id="{B93A2484-84B7-A698-AE5C-8EB6A3A2B4F5}"/>
-              </a:ext>
-            </a:extLst>
-          </p:cNvPr>
-          <p:cNvSpPr>
-            <a:spLocks noGrp="1"/>
-          </p:cNvSpPr>
-          <p:nvPr>
-            <p:ph idx="1"/>
-          </p:nvPr>
-        </p:nvSpPr>
-        <p:spPr/>
-        <p:txBody>
-          <a:bodyPr/>
-          <a:lstStyle/>
-          <a:p>
-            <a:endParaRPr lang="en-US"/>
-          </a:p>
-        </p:txBody>
-      </p:sp>
+      <p:pic>
+        <p:nvPicPr>
+          <p:cNvPr id="3" name="Picture 2">
+            <a:extLst>
+              <a:ext uri="{FF2B5EF4-FFF2-40B4-BE49-F238E27FC236}">
+                <a16:creationId xmlns:a16="http://schemas.microsoft.com/office/drawing/2014/main" id="{51861E21-5783-B458-6BFF-3B323DF782FC}"/>
+              </a:ext>
+            </a:extLst>
+          </p:cNvPr>
+          <p:cNvPicPr>
+            <a:picLocks noChangeAspect="1"/>
+          </p:cNvPicPr>
+          <p:nvPr/>
+        </p:nvPicPr>
+        <p:blipFill>
+          <a:blip r:embed="rId2"/>
+          <a:stretch>
+            <a:fillRect/>
+          </a:stretch>
+        </p:blipFill>
+        <p:spPr>
+          <a:xfrm>
+            <a:off x="648633" y="133325"/>
+            <a:ext cx="10894734" cy="6591350"/>
+          </a:xfrm>
+          <a:prstGeom prst="rect">
+            <a:avLst/>
+          </a:prstGeom>
+        </p:spPr>
+      </p:pic>
     </p:spTree>
     <p:extLst>
       <p:ext uri="{BB962C8B-B14F-4D97-AF65-F5344CB8AC3E}">
-        <p14:creationId xmlns:p14="http://schemas.microsoft.com/office/powerpoint/2010/main" val="2467922701"/>
+        <p14:creationId xmlns:p14="http://schemas.microsoft.com/office/powerpoint/2010/main" val="504785334"/>
       </p:ext>
     </p:extLst>
   </p:cSld>
@@ -3494,10 +3468,10 @@
       </p:grpSpPr>
       <p:pic>
         <p:nvPicPr>
-          <p:cNvPr id="2" name="Picture 1">
-            <a:extLst>
-              <a:ext uri="{FF2B5EF4-FFF2-40B4-BE49-F238E27FC236}">
-                <a16:creationId xmlns:a16="http://schemas.microsoft.com/office/drawing/2014/main" id="{5164DA5C-C450-9C0D-8036-DFAE1D4B721F}"/>
+          <p:cNvPr id="3" name="Picture 2">
+            <a:extLst>
+              <a:ext uri="{FF2B5EF4-FFF2-40B4-BE49-F238E27FC236}">
+                <a16:creationId xmlns:a16="http://schemas.microsoft.com/office/drawing/2014/main" id="{2421724F-D566-C344-917F-CAB58A98DF9F}"/>
               </a:ext>
             </a:extLst>
           </p:cNvPr>
@@ -3514,577 +3488,8 @@
         </p:blipFill>
         <p:spPr>
           <a:xfrm>
-            <a:off x="963848" y="757947"/>
-            <a:ext cx="1104900" cy="1104900"/>
-          </a:xfrm>
-          <a:prstGeom prst="rect">
-            <a:avLst/>
-          </a:prstGeom>
-        </p:spPr>
-      </p:pic>
-      <p:pic>
-        <p:nvPicPr>
-          <p:cNvPr id="1026" name="Picture 2" descr="Arduino UNO R4 Minima [ABX00080] - Renesas RA4M1 - USB-C, CAN, DAC (12 bit), OP AMP, SWD Connector">
-            <a:extLst>
-              <a:ext uri="{FF2B5EF4-FFF2-40B4-BE49-F238E27FC236}">
-                <a16:creationId xmlns:a16="http://schemas.microsoft.com/office/drawing/2014/main" id="{80FA09BB-8DA6-0537-C94A-407533214FF0}"/>
-              </a:ext>
-            </a:extLst>
-          </p:cNvPr>
-          <p:cNvPicPr>
-            <a:picLocks noChangeAspect="1" noChangeArrowheads="1"/>
-          </p:cNvPicPr>
-          <p:nvPr/>
-        </p:nvPicPr>
-        <p:blipFill>
-          <a:blip r:embed="rId3">
-            <a:extLst>
-              <a:ext uri="{28A0092B-C50C-407E-A947-70E740481C1C}">
-                <a14:useLocalDpi xmlns:a14="http://schemas.microsoft.com/office/drawing/2010/main" val="0"/>
-              </a:ext>
-            </a:extLst>
-          </a:blip>
-          <a:srcRect/>
-          <a:stretch>
-            <a:fillRect/>
-          </a:stretch>
-        </p:blipFill>
-        <p:spPr bwMode="auto">
-          <a:xfrm>
-            <a:off x="3247823" y="549613"/>
-            <a:ext cx="2381250" cy="1785938"/>
-          </a:xfrm>
-          <a:prstGeom prst="rect">
-            <a:avLst/>
-          </a:prstGeom>
-          <a:noFill/>
-          <a:extLst>
-            <a:ext uri="{909E8E84-426E-40DD-AFC4-6F175D3DCCD1}">
-              <a14:hiddenFill xmlns:a14="http://schemas.microsoft.com/office/drawing/2010/main">
-                <a:solidFill>
-                  <a:srgbClr val="FFFFFF"/>
-                </a:solidFill>
-              </a14:hiddenFill>
-            </a:ext>
-          </a:extLst>
-        </p:spPr>
-      </p:pic>
-      <p:pic>
-        <p:nvPicPr>
-          <p:cNvPr id="3" name="Picture 2">
-            <a:extLst>
-              <a:ext uri="{FF2B5EF4-FFF2-40B4-BE49-F238E27FC236}">
-                <a16:creationId xmlns:a16="http://schemas.microsoft.com/office/drawing/2014/main" id="{187E3E33-2A6A-E509-0B0E-2681F90CF922}"/>
-              </a:ext>
-            </a:extLst>
-          </p:cNvPr>
-          <p:cNvPicPr>
-            <a:picLocks noChangeAspect="1"/>
-          </p:cNvPicPr>
-          <p:nvPr/>
-        </p:nvPicPr>
-        <p:blipFill>
-          <a:blip r:embed="rId4"/>
-          <a:stretch>
-            <a:fillRect/>
-          </a:stretch>
-        </p:blipFill>
-        <p:spPr>
-          <a:xfrm>
-            <a:off x="6562929" y="713767"/>
-            <a:ext cx="1149080" cy="1149080"/>
-          </a:xfrm>
-          <a:prstGeom prst="rect">
-            <a:avLst/>
-          </a:prstGeom>
-        </p:spPr>
-      </p:pic>
-      <p:cxnSp>
-        <p:nvCxnSpPr>
-          <p:cNvPr id="5" name="Straight Arrow Connector 4">
-            <a:extLst>
-              <a:ext uri="{FF2B5EF4-FFF2-40B4-BE49-F238E27FC236}">
-                <a16:creationId xmlns:a16="http://schemas.microsoft.com/office/drawing/2014/main" id="{9C160C9C-5E06-A54D-A9F9-ADE9C0CD2BF5}"/>
-              </a:ext>
-            </a:extLst>
-          </p:cNvPr>
-          <p:cNvCxnSpPr>
-            <a:cxnSpLocks/>
-            <a:stCxn id="2" idx="3"/>
-          </p:cNvCxnSpPr>
-          <p:nvPr/>
-        </p:nvCxnSpPr>
-        <p:spPr>
-          <a:xfrm flipV="1">
-            <a:off x="2068748" y="1288307"/>
-            <a:ext cx="1481848" cy="22090"/>
-          </a:xfrm>
-          <a:prstGeom prst="straightConnector1">
-            <a:avLst/>
-          </a:prstGeom>
-          <a:ln>
-            <a:tailEnd type="triangle"/>
-          </a:ln>
-        </p:spPr>
-        <p:style>
-          <a:lnRef idx="2">
-            <a:schemeClr val="accent1"/>
-          </a:lnRef>
-          <a:fillRef idx="0">
-            <a:schemeClr val="accent1"/>
-          </a:fillRef>
-          <a:effectRef idx="1">
-            <a:schemeClr val="accent1"/>
-          </a:effectRef>
-          <a:fontRef idx="minor">
-            <a:schemeClr val="tx1"/>
-          </a:fontRef>
-        </p:style>
-      </p:cxnSp>
-      <p:cxnSp>
-        <p:nvCxnSpPr>
-          <p:cNvPr id="7" name="Straight Arrow Connector 6">
-            <a:extLst>
-              <a:ext uri="{FF2B5EF4-FFF2-40B4-BE49-F238E27FC236}">
-                <a16:creationId xmlns:a16="http://schemas.microsoft.com/office/drawing/2014/main" id="{B280AEBA-2D5B-82D8-079B-5056234D169D}"/>
-              </a:ext>
-            </a:extLst>
-          </p:cNvPr>
-          <p:cNvCxnSpPr>
-            <a:cxnSpLocks/>
-          </p:cNvCxnSpPr>
-          <p:nvPr/>
-        </p:nvCxnSpPr>
-        <p:spPr>
-          <a:xfrm>
-            <a:off x="5506462" y="1311208"/>
-            <a:ext cx="1179075" cy="0"/>
-          </a:xfrm>
-          <a:prstGeom prst="straightConnector1">
-            <a:avLst/>
-          </a:prstGeom>
-          <a:ln>
-            <a:tailEnd type="triangle"/>
-          </a:ln>
-        </p:spPr>
-        <p:style>
-          <a:lnRef idx="2">
-            <a:schemeClr val="accent1"/>
-          </a:lnRef>
-          <a:fillRef idx="0">
-            <a:schemeClr val="accent1"/>
-          </a:fillRef>
-          <a:effectRef idx="1">
-            <a:schemeClr val="accent1"/>
-          </a:effectRef>
-          <a:fontRef idx="minor">
-            <a:schemeClr val="tx1"/>
-          </a:fontRef>
-        </p:style>
-      </p:cxnSp>
-      <p:sp>
-        <p:nvSpPr>
-          <p:cNvPr id="8" name="TextBox 7">
-            <a:extLst>
-              <a:ext uri="{FF2B5EF4-FFF2-40B4-BE49-F238E27FC236}">
-                <a16:creationId xmlns:a16="http://schemas.microsoft.com/office/drawing/2014/main" id="{0D31F3B7-AABA-800B-C67E-4CA65BC1FA64}"/>
-              </a:ext>
-            </a:extLst>
-          </p:cNvPr>
-          <p:cNvSpPr txBox="1"/>
-          <p:nvPr/>
-        </p:nvSpPr>
-        <p:spPr>
-          <a:xfrm>
-            <a:off x="2163102" y="918975"/>
-            <a:ext cx="1162626" cy="369332"/>
-          </a:xfrm>
-          <a:prstGeom prst="rect">
-            <a:avLst/>
-          </a:prstGeom>
-          <a:noFill/>
-        </p:spPr>
-        <p:txBody>
-          <a:bodyPr wrap="none" rtlCol="0">
-            <a:spAutoFit/>
-          </a:bodyPr>
-          <a:lstStyle/>
-          <a:p>
-            <a:r>
-              <a:rPr lang="en-US" dirty="0" err="1"/>
-              <a:t>BlueTooth</a:t>
-            </a:r>
-            <a:endParaRPr lang="en-US" dirty="0"/>
-          </a:p>
-        </p:txBody>
-      </p:sp>
-      <p:sp>
-        <p:nvSpPr>
-          <p:cNvPr id="10" name="TextBox 9">
-            <a:extLst>
-              <a:ext uri="{FF2B5EF4-FFF2-40B4-BE49-F238E27FC236}">
-                <a16:creationId xmlns:a16="http://schemas.microsoft.com/office/drawing/2014/main" id="{A9426648-9254-D1C4-74D9-AD3E88C742C2}"/>
-              </a:ext>
-            </a:extLst>
-          </p:cNvPr>
-          <p:cNvSpPr txBox="1"/>
-          <p:nvPr/>
-        </p:nvSpPr>
-        <p:spPr>
-          <a:xfrm>
-            <a:off x="5629072" y="963459"/>
-            <a:ext cx="617220" cy="369332"/>
-          </a:xfrm>
-          <a:prstGeom prst="rect">
-            <a:avLst/>
-          </a:prstGeom>
-          <a:noFill/>
-        </p:spPr>
-        <p:txBody>
-          <a:bodyPr wrap="none" rtlCol="0">
-            <a:spAutoFit/>
-          </a:bodyPr>
-          <a:lstStyle/>
-          <a:p>
-            <a:r>
-              <a:rPr lang="en-US" dirty="0" err="1"/>
-              <a:t>WiFi</a:t>
-            </a:r>
-            <a:endParaRPr lang="en-US" dirty="0"/>
-          </a:p>
-        </p:txBody>
-      </p:sp>
-      <p:pic>
-        <p:nvPicPr>
-          <p:cNvPr id="11" name="Picture 10">
-            <a:extLst>
-              <a:ext uri="{FF2B5EF4-FFF2-40B4-BE49-F238E27FC236}">
-                <a16:creationId xmlns:a16="http://schemas.microsoft.com/office/drawing/2014/main" id="{DF1FE55C-B729-5442-EF1E-5B508B88274C}"/>
-              </a:ext>
-            </a:extLst>
-          </p:cNvPr>
-          <p:cNvPicPr>
-            <a:picLocks noChangeAspect="1"/>
-          </p:cNvPicPr>
-          <p:nvPr/>
-        </p:nvPicPr>
-        <p:blipFill>
-          <a:blip r:embed="rId4"/>
-          <a:stretch>
-            <a:fillRect/>
-          </a:stretch>
-        </p:blipFill>
-        <p:spPr>
-          <a:xfrm>
-            <a:off x="1014022" y="3191078"/>
-            <a:ext cx="1149080" cy="1149080"/>
-          </a:xfrm>
-          <a:prstGeom prst="rect">
-            <a:avLst/>
-          </a:prstGeom>
-        </p:spPr>
-      </p:pic>
-      <p:pic>
-        <p:nvPicPr>
-          <p:cNvPr id="1028" name="Picture 4" descr="TP-Link CPE710 | 5GHz AC 867Mbps Long Range Gigabit Outdoor CPE for PtP and PtMP Transmission | Point to Point Wireless Br...">
-            <a:extLst>
-              <a:ext uri="{FF2B5EF4-FFF2-40B4-BE49-F238E27FC236}">
-                <a16:creationId xmlns:a16="http://schemas.microsoft.com/office/drawing/2014/main" id="{AB0CE4E5-EF53-1BFF-AC0E-45A44658ADA9}"/>
-              </a:ext>
-            </a:extLst>
-          </p:cNvPr>
-          <p:cNvPicPr>
-            <a:picLocks noChangeAspect="1" noChangeArrowheads="1"/>
-          </p:cNvPicPr>
-          <p:nvPr/>
-        </p:nvPicPr>
-        <p:blipFill>
-          <a:blip r:embed="rId5">
-            <a:extLst>
-              <a:ext uri="{28A0092B-C50C-407E-A947-70E740481C1C}">
-                <a14:useLocalDpi xmlns:a14="http://schemas.microsoft.com/office/drawing/2010/main" val="0"/>
-              </a:ext>
-            </a:extLst>
-          </a:blip>
-          <a:srcRect/>
-          <a:stretch>
-            <a:fillRect/>
-          </a:stretch>
-        </p:blipFill>
-        <p:spPr bwMode="auto">
-          <a:xfrm rot="10800000">
-            <a:off x="2809672" y="3020134"/>
-            <a:ext cx="1729731" cy="1502316"/>
-          </a:xfrm>
-          <a:prstGeom prst="rect">
-            <a:avLst/>
-          </a:prstGeom>
-          <a:noFill/>
-          <a:extLst>
-            <a:ext uri="{909E8E84-426E-40DD-AFC4-6F175D3DCCD1}">
-              <a14:hiddenFill xmlns:a14="http://schemas.microsoft.com/office/drawing/2010/main">
-                <a:solidFill>
-                  <a:srgbClr val="FFFFFF"/>
-                </a:solidFill>
-              </a14:hiddenFill>
-            </a:ext>
-          </a:extLst>
-        </p:spPr>
-      </p:pic>
-      <p:pic>
-        <p:nvPicPr>
-          <p:cNvPr id="12" name="Picture 4" descr="TP-Link CPE710 | 5GHz AC 867Mbps Long Range Gigabit Outdoor CPE for PtP and PtMP Transmission | Point to Point Wireless Br...">
-            <a:extLst>
-              <a:ext uri="{FF2B5EF4-FFF2-40B4-BE49-F238E27FC236}">
-                <a16:creationId xmlns:a16="http://schemas.microsoft.com/office/drawing/2014/main" id="{849E8E53-9129-ABFC-6061-824CD243EFAC}"/>
-              </a:ext>
-            </a:extLst>
-          </p:cNvPr>
-          <p:cNvPicPr>
-            <a:picLocks noChangeAspect="1" noChangeArrowheads="1"/>
-          </p:cNvPicPr>
-          <p:nvPr/>
-        </p:nvPicPr>
-        <p:blipFill>
-          <a:blip r:embed="rId5">
-            <a:extLst>
-              <a:ext uri="{28A0092B-C50C-407E-A947-70E740481C1C}">
-                <a14:useLocalDpi xmlns:a14="http://schemas.microsoft.com/office/drawing/2010/main" val="0"/>
-              </a:ext>
-            </a:extLst>
-          </a:blip>
-          <a:srcRect/>
-          <a:stretch>
-            <a:fillRect/>
-          </a:stretch>
-        </p:blipFill>
-        <p:spPr bwMode="auto">
-          <a:xfrm>
-            <a:off x="5805387" y="2956905"/>
-            <a:ext cx="1729730" cy="1502315"/>
-          </a:xfrm>
-          <a:prstGeom prst="rect">
-            <a:avLst/>
-          </a:prstGeom>
-          <a:noFill/>
-          <a:extLst>
-            <a:ext uri="{909E8E84-426E-40DD-AFC4-6F175D3DCCD1}">
-              <a14:hiddenFill xmlns:a14="http://schemas.microsoft.com/office/drawing/2010/main">
-                <a:solidFill>
-                  <a:srgbClr val="FFFFFF"/>
-                </a:solidFill>
-              </a14:hiddenFill>
-            </a:ext>
-          </a:extLst>
-        </p:spPr>
-      </p:pic>
-      <p:pic>
-        <p:nvPicPr>
-          <p:cNvPr id="1030" name="Picture 6" descr="Dell 15 15.6&quot; FHD 120Hz Business Laptop Computer, Intel 10-Core i5-1235U (Beat i7-1195G7), 32GB DDR4 RAM, 1TB PCIe SSD, 80...">
-            <a:extLst>
-              <a:ext uri="{FF2B5EF4-FFF2-40B4-BE49-F238E27FC236}">
-                <a16:creationId xmlns:a16="http://schemas.microsoft.com/office/drawing/2014/main" id="{38721EC2-6A7A-D93D-D176-FB66EFD935BB}"/>
-              </a:ext>
-            </a:extLst>
-          </p:cNvPr>
-          <p:cNvPicPr>
-            <a:picLocks noChangeAspect="1" noChangeArrowheads="1"/>
-          </p:cNvPicPr>
-          <p:nvPr/>
-        </p:nvPicPr>
-        <p:blipFill>
-          <a:blip r:embed="rId6">
-            <a:extLst>
-              <a:ext uri="{28A0092B-C50C-407E-A947-70E740481C1C}">
-                <a14:useLocalDpi xmlns:a14="http://schemas.microsoft.com/office/drawing/2010/main" val="0"/>
-              </a:ext>
-            </a:extLst>
-          </a:blip>
-          <a:srcRect/>
-          <a:stretch>
-            <a:fillRect/>
-          </a:stretch>
-        </p:blipFill>
-        <p:spPr bwMode="auto">
-          <a:xfrm>
-            <a:off x="9670481" y="3114282"/>
-            <a:ext cx="1819985" cy="1344938"/>
-          </a:xfrm>
-          <a:prstGeom prst="rect">
-            <a:avLst/>
-          </a:prstGeom>
-          <a:noFill/>
-          <a:extLst>
-            <a:ext uri="{909E8E84-426E-40DD-AFC4-6F175D3DCCD1}">
-              <a14:hiddenFill xmlns:a14="http://schemas.microsoft.com/office/drawing/2010/main">
-                <a:solidFill>
-                  <a:srgbClr val="FFFFFF"/>
-                </a:solidFill>
-              </a14:hiddenFill>
-            </a:ext>
-          </a:extLst>
-        </p:spPr>
-      </p:pic>
-      <p:pic>
-        <p:nvPicPr>
-          <p:cNvPr id="13" name="Picture 12">
-            <a:extLst>
-              <a:ext uri="{FF2B5EF4-FFF2-40B4-BE49-F238E27FC236}">
-                <a16:creationId xmlns:a16="http://schemas.microsoft.com/office/drawing/2014/main" id="{84B29575-F23B-4383-7286-B9406409B3D5}"/>
-              </a:ext>
-            </a:extLst>
-          </p:cNvPr>
-          <p:cNvPicPr>
-            <a:picLocks noChangeAspect="1"/>
-          </p:cNvPicPr>
-          <p:nvPr/>
-        </p:nvPicPr>
-        <p:blipFill>
-          <a:blip r:embed="rId7"/>
-          <a:stretch>
-            <a:fillRect/>
-          </a:stretch>
-        </p:blipFill>
-        <p:spPr>
-          <a:xfrm>
-            <a:off x="7823269" y="3272708"/>
-            <a:ext cx="1559060" cy="1219647"/>
-          </a:xfrm>
-          <a:prstGeom prst="rect">
-            <a:avLst/>
-          </a:prstGeom>
-        </p:spPr>
-      </p:pic>
-      <p:pic>
-        <p:nvPicPr>
-          <p:cNvPr id="14" name="Picture 13">
-            <a:extLst>
-              <a:ext uri="{FF2B5EF4-FFF2-40B4-BE49-F238E27FC236}">
-                <a16:creationId xmlns:a16="http://schemas.microsoft.com/office/drawing/2014/main" id="{49729EE8-3EA8-27E5-5BBD-AA44947DE1F1}"/>
-              </a:ext>
-            </a:extLst>
-          </p:cNvPr>
-          <p:cNvPicPr>
-            <a:picLocks noChangeAspect="1"/>
-          </p:cNvPicPr>
-          <p:nvPr/>
-        </p:nvPicPr>
-        <p:blipFill>
-          <a:blip r:embed="rId8"/>
-          <a:stretch>
-            <a:fillRect/>
-          </a:stretch>
-        </p:blipFill>
-        <p:spPr>
-          <a:xfrm>
-            <a:off x="6577520" y="5129212"/>
-            <a:ext cx="1119897" cy="1119897"/>
-          </a:xfrm>
-          <a:prstGeom prst="rect">
-            <a:avLst/>
-          </a:prstGeom>
-        </p:spPr>
-      </p:pic>
-      <p:cxnSp>
-        <p:nvCxnSpPr>
-          <p:cNvPr id="16" name="Connector: Curved 15">
-            <a:extLst>
-              <a:ext uri="{FF2B5EF4-FFF2-40B4-BE49-F238E27FC236}">
-                <a16:creationId xmlns:a16="http://schemas.microsoft.com/office/drawing/2014/main" id="{2576F88D-032F-8327-7439-F368C95186E5}"/>
-              </a:ext>
-            </a:extLst>
-          </p:cNvPr>
-          <p:cNvCxnSpPr>
-            <a:cxnSpLocks/>
-            <a:stCxn id="11" idx="0"/>
-            <a:endCxn id="3" idx="2"/>
-          </p:cNvCxnSpPr>
-          <p:nvPr/>
-        </p:nvCxnSpPr>
-        <p:spPr>
-          <a:xfrm rot="5400000" flipH="1" flipV="1">
-            <a:off x="3698900" y="-247490"/>
-            <a:ext cx="1328231" cy="5548907"/>
-          </a:xfrm>
-          <a:prstGeom prst="curvedConnector3">
-            <a:avLst>
-              <a:gd name="adj1" fmla="val 50000"/>
-            </a:avLst>
-          </a:prstGeom>
-          <a:ln>
-            <a:headEnd type="triangle"/>
-            <a:tailEnd type="triangle"/>
-          </a:ln>
-        </p:spPr>
-        <p:style>
-          <a:lnRef idx="2">
-            <a:schemeClr val="accent1"/>
-          </a:lnRef>
-          <a:fillRef idx="0">
-            <a:schemeClr val="accent1"/>
-          </a:fillRef>
-          <a:effectRef idx="1">
-            <a:schemeClr val="accent1"/>
-          </a:effectRef>
-          <a:fontRef idx="minor">
-            <a:schemeClr val="tx1"/>
-          </a:fontRef>
-        </p:style>
-      </p:cxnSp>
-      <p:pic>
-        <p:nvPicPr>
-          <p:cNvPr id="21" name="Picture 20">
-            <a:extLst>
-              <a:ext uri="{FF2B5EF4-FFF2-40B4-BE49-F238E27FC236}">
-                <a16:creationId xmlns:a16="http://schemas.microsoft.com/office/drawing/2014/main" id="{F8B12FAA-D372-2D95-4463-843A69DA5F0C}"/>
-              </a:ext>
-            </a:extLst>
-          </p:cNvPr>
-          <p:cNvPicPr>
-            <a:picLocks noChangeAspect="1"/>
-          </p:cNvPicPr>
-          <p:nvPr/>
-        </p:nvPicPr>
-        <p:blipFill>
-          <a:blip r:embed="rId9"/>
-          <a:stretch>
-            <a:fillRect/>
-          </a:stretch>
-        </p:blipFill>
-        <p:spPr>
-          <a:xfrm>
-            <a:off x="9823047" y="4893013"/>
-            <a:ext cx="646992" cy="905788"/>
-          </a:xfrm>
-          <a:prstGeom prst="rect">
-            <a:avLst/>
-          </a:prstGeom>
-        </p:spPr>
-      </p:pic>
-      <p:pic>
-        <p:nvPicPr>
-          <p:cNvPr id="22" name="Picture 21">
-            <a:extLst>
-              <a:ext uri="{FF2B5EF4-FFF2-40B4-BE49-F238E27FC236}">
-                <a16:creationId xmlns:a16="http://schemas.microsoft.com/office/drawing/2014/main" id="{092C40AE-D689-7186-0F26-1D30B472ECE5}"/>
-              </a:ext>
-            </a:extLst>
-          </p:cNvPr>
-          <p:cNvPicPr>
-            <a:picLocks noChangeAspect="1"/>
-          </p:cNvPicPr>
-          <p:nvPr/>
-        </p:nvPicPr>
-        <p:blipFill>
-          <a:blip r:embed="rId9"/>
-          <a:stretch>
-            <a:fillRect/>
-          </a:stretch>
-        </p:blipFill>
-        <p:spPr>
-          <a:xfrm>
-            <a:off x="10564095" y="5609618"/>
-            <a:ext cx="646992" cy="905788"/>
+            <a:off x="572193" y="169407"/>
+            <a:ext cx="11047613" cy="6519185"/>
           </a:xfrm>
           <a:prstGeom prst="rect">
             <a:avLst/>
@@ -4094,37 +3499,7 @@
     </p:spTree>
     <p:extLst>
       <p:ext uri="{BB962C8B-B14F-4D97-AF65-F5344CB8AC3E}">
-        <p14:creationId xmlns:p14="http://schemas.microsoft.com/office/powerpoint/2010/main" val="3853798533"/>
-      </p:ext>
-    </p:extLst>
-  </p:cSld>
-  <p:clrMapOvr>
-    <a:masterClrMapping/>
-  </p:clrMapOvr>
-</p:sld>
-</file>
-
-<file path=ppt/slides/slide4.xml><?xml version="1.0" encoding="utf-8"?>
-<p:sld xmlns:a="http://schemas.openxmlformats.org/drawingml/2006/main" xmlns:r="http://schemas.openxmlformats.org/officeDocument/2006/relationships" xmlns:p="http://schemas.openxmlformats.org/presentationml/2006/main">
-  <p:cSld>
-    <p:spTree>
-      <p:nvGrpSpPr>
-        <p:cNvPr id="1" name=""/>
-        <p:cNvGrpSpPr/>
-        <p:nvPr/>
-      </p:nvGrpSpPr>
-      <p:grpSpPr>
-        <a:xfrm>
-          <a:off x="0" y="0"/>
-          <a:ext cx="0" cy="0"/>
-          <a:chOff x="0" y="0"/>
-          <a:chExt cx="0" cy="0"/>
-        </a:xfrm>
-      </p:grpSpPr>
-    </p:spTree>
-    <p:extLst>
-      <p:ext uri="{BB962C8B-B14F-4D97-AF65-F5344CB8AC3E}">
-        <p14:creationId xmlns:p14="http://schemas.microsoft.com/office/powerpoint/2010/main" val="2999173626"/>
+        <p14:creationId xmlns:p14="http://schemas.microsoft.com/office/powerpoint/2010/main" val="213061990"/>
       </p:ext>
     </p:extLst>
   </p:cSld>

</xml_diff>